<commit_message>
LR3 - seems to be ready. Pattern composite
</commit_message>
<xml_diff>
--- a/builder/builder.pptx
+++ b/builder/builder.pptx
@@ -271,7 +271,7 @@
           <a:p>
             <a:fld id="{EC21E27C-C9F9-4567-86AB-DEEDCEFF73CB}" type="datetimeFigureOut">
               <a:rPr lang="en-US" smtClean="0"/>
-              <a:t>01-Apr-22</a:t>
+              <a:t>18-Apr-22</a:t>
             </a:fld>
             <a:endParaRPr lang="en-US"/>
           </a:p>
@@ -469,7 +469,7 @@
           <a:p>
             <a:fld id="{EC21E27C-C9F9-4567-86AB-DEEDCEFF73CB}" type="datetimeFigureOut">
               <a:rPr lang="en-US" smtClean="0"/>
-              <a:t>01-Apr-22</a:t>
+              <a:t>18-Apr-22</a:t>
             </a:fld>
             <a:endParaRPr lang="en-US"/>
           </a:p>
@@ -677,7 +677,7 @@
           <a:p>
             <a:fld id="{EC21E27C-C9F9-4567-86AB-DEEDCEFF73CB}" type="datetimeFigureOut">
               <a:rPr lang="en-US" smtClean="0"/>
-              <a:t>01-Apr-22</a:t>
+              <a:t>18-Apr-22</a:t>
             </a:fld>
             <a:endParaRPr lang="en-US"/>
           </a:p>
@@ -875,7 +875,7 @@
           <a:p>
             <a:fld id="{EC21E27C-C9F9-4567-86AB-DEEDCEFF73CB}" type="datetimeFigureOut">
               <a:rPr lang="en-US" smtClean="0"/>
-              <a:t>01-Apr-22</a:t>
+              <a:t>18-Apr-22</a:t>
             </a:fld>
             <a:endParaRPr lang="en-US"/>
           </a:p>
@@ -1150,7 +1150,7 @@
           <a:p>
             <a:fld id="{EC21E27C-C9F9-4567-86AB-DEEDCEFF73CB}" type="datetimeFigureOut">
               <a:rPr lang="en-US" smtClean="0"/>
-              <a:t>01-Apr-22</a:t>
+              <a:t>18-Apr-22</a:t>
             </a:fld>
             <a:endParaRPr lang="en-US"/>
           </a:p>
@@ -1415,7 +1415,7 @@
           <a:p>
             <a:fld id="{EC21E27C-C9F9-4567-86AB-DEEDCEFF73CB}" type="datetimeFigureOut">
               <a:rPr lang="en-US" smtClean="0"/>
-              <a:t>01-Apr-22</a:t>
+              <a:t>18-Apr-22</a:t>
             </a:fld>
             <a:endParaRPr lang="en-US"/>
           </a:p>
@@ -1827,7 +1827,7 @@
           <a:p>
             <a:fld id="{EC21E27C-C9F9-4567-86AB-DEEDCEFF73CB}" type="datetimeFigureOut">
               <a:rPr lang="en-US" smtClean="0"/>
-              <a:t>01-Apr-22</a:t>
+              <a:t>18-Apr-22</a:t>
             </a:fld>
             <a:endParaRPr lang="en-US"/>
           </a:p>
@@ -1968,7 +1968,7 @@
           <a:p>
             <a:fld id="{EC21E27C-C9F9-4567-86AB-DEEDCEFF73CB}" type="datetimeFigureOut">
               <a:rPr lang="en-US" smtClean="0"/>
-              <a:t>01-Apr-22</a:t>
+              <a:t>18-Apr-22</a:t>
             </a:fld>
             <a:endParaRPr lang="en-US"/>
           </a:p>
@@ -2081,7 +2081,7 @@
           <a:p>
             <a:fld id="{EC21E27C-C9F9-4567-86AB-DEEDCEFF73CB}" type="datetimeFigureOut">
               <a:rPr lang="en-US" smtClean="0"/>
-              <a:t>01-Apr-22</a:t>
+              <a:t>18-Apr-22</a:t>
             </a:fld>
             <a:endParaRPr lang="en-US"/>
           </a:p>
@@ -2392,7 +2392,7 @@
           <a:p>
             <a:fld id="{EC21E27C-C9F9-4567-86AB-DEEDCEFF73CB}" type="datetimeFigureOut">
               <a:rPr lang="en-US" smtClean="0"/>
-              <a:t>01-Apr-22</a:t>
+              <a:t>18-Apr-22</a:t>
             </a:fld>
             <a:endParaRPr lang="en-US"/>
           </a:p>
@@ -2680,7 +2680,7 @@
           <a:p>
             <a:fld id="{EC21E27C-C9F9-4567-86AB-DEEDCEFF73CB}" type="datetimeFigureOut">
               <a:rPr lang="en-US" smtClean="0"/>
-              <a:t>01-Apr-22</a:t>
+              <a:t>18-Apr-22</a:t>
             </a:fld>
             <a:endParaRPr lang="en-US"/>
           </a:p>
@@ -2921,7 +2921,7 @@
           <a:p>
             <a:fld id="{EC21E27C-C9F9-4567-86AB-DEEDCEFF73CB}" type="datetimeFigureOut">
               <a:rPr lang="en-US" smtClean="0"/>
-              <a:t>01-Apr-22</a:t>
+              <a:t>18-Apr-22</a:t>
             </a:fld>
             <a:endParaRPr lang="en-US"/>
           </a:p>

</xml_diff>